<commit_message>
Added GameLibrary frontend, reworked backend to handle frontend
</commit_message>
<xml_diff>
--- a/docs/convention_over_configuration.pptx
+++ b/docs/convention_over_configuration.pptx
@@ -5,7 +5,7 @@
     <p:sldMasterId id="2147483684" r:id="rId1"/>
   </p:sldMasterIdLst>
   <p:notesMasterIdLst>
-    <p:notesMasterId r:id="rId8"/>
+    <p:notesMasterId r:id="rId9"/>
   </p:notesMasterIdLst>
   <p:sldIdLst>
     <p:sldId id="287" r:id="rId2"/>
@@ -14,6 +14,7 @@
     <p:sldId id="290" r:id="rId5"/>
     <p:sldId id="291" r:id="rId6"/>
     <p:sldId id="292" r:id="rId7"/>
+    <p:sldId id="293" r:id="rId8"/>
   </p:sldIdLst>
   <p:sldSz cx="9144000" cy="6858000" type="screen4x3"/>
   <p:notesSz cx="6858000" cy="9144000"/>
@@ -198,7 +199,7 @@
             <a:fld id="{DE2A99C0-0CF4-426E-9D6D-1394ADDD28E9}" type="datetimeFigureOut">
               <a:rPr lang="en-US" smtClean="0"/>
               <a:pPr/>
-              <a:t>11/13/2010</a:t>
+              <a:t>11/20/2010</a:t>
             </a:fld>
             <a:endParaRPr lang="en-US"/>
           </a:p>
@@ -833,7 +834,7 @@
             <a:fld id="{AC52CBD9-6304-444B-95DF-80988D1CE7EB}" type="datetimeFigureOut">
               <a:rPr lang="en-US" smtClean="0"/>
               <a:pPr/>
-              <a:t>11/13/2010</a:t>
+              <a:t>11/20/2010</a:t>
             </a:fld>
             <a:endParaRPr lang="en-US"/>
           </a:p>
@@ -1061,7 +1062,7 @@
             <a:fld id="{AC52CBD9-6304-444B-95DF-80988D1CE7EB}" type="datetimeFigureOut">
               <a:rPr lang="en-US" smtClean="0"/>
               <a:pPr/>
-              <a:t>11/13/2010</a:t>
+              <a:t>11/20/2010</a:t>
             </a:fld>
             <a:endParaRPr lang="en-US"/>
           </a:p>
@@ -1238,7 +1239,7 @@
             <a:fld id="{AC52CBD9-6304-444B-95DF-80988D1CE7EB}" type="datetimeFigureOut">
               <a:rPr lang="en-US" smtClean="0"/>
               <a:pPr/>
-              <a:t>11/13/2010</a:t>
+              <a:t>11/20/2010</a:t>
             </a:fld>
             <a:endParaRPr lang="en-US"/>
           </a:p>
@@ -1431,7 +1432,7 @@
             <a:fld id="{AC52CBD9-6304-444B-95DF-80988D1CE7EB}" type="datetimeFigureOut">
               <a:rPr lang="en-US" smtClean="0"/>
               <a:pPr/>
-              <a:t>11/13/2010</a:t>
+              <a:t>11/20/2010</a:t>
             </a:fld>
             <a:endParaRPr lang="en-US"/>
           </a:p>
@@ -1672,7 +1673,7 @@
             <a:fld id="{AC52CBD9-6304-444B-95DF-80988D1CE7EB}" type="datetimeFigureOut">
               <a:rPr lang="en-US" smtClean="0"/>
               <a:pPr/>
-              <a:t>11/13/2010</a:t>
+              <a:t>11/20/2010</a:t>
             </a:fld>
             <a:endParaRPr lang="en-US"/>
           </a:p>
@@ -1938,7 +1939,7 @@
             <a:fld id="{AC52CBD9-6304-444B-95DF-80988D1CE7EB}" type="datetimeFigureOut">
               <a:rPr lang="en-US" smtClean="0"/>
               <a:pPr/>
-              <a:t>11/13/2010</a:t>
+              <a:t>11/20/2010</a:t>
             </a:fld>
             <a:endParaRPr lang="en-US"/>
           </a:p>
@@ -2314,7 +2315,7 @@
             <a:fld id="{AC52CBD9-6304-444B-95DF-80988D1CE7EB}" type="datetimeFigureOut">
               <a:rPr lang="en-US" smtClean="0"/>
               <a:pPr/>
-              <a:t>11/13/2010</a:t>
+              <a:t>11/20/2010</a:t>
             </a:fld>
             <a:endParaRPr lang="en-US"/>
           </a:p>
@@ -2429,7 +2430,7 @@
             <a:fld id="{AC52CBD9-6304-444B-95DF-80988D1CE7EB}" type="datetimeFigureOut">
               <a:rPr lang="en-US" smtClean="0"/>
               <a:pPr/>
-              <a:t>11/13/2010</a:t>
+              <a:t>11/20/2010</a:t>
             </a:fld>
             <a:endParaRPr lang="en-US"/>
           </a:p>
@@ -2521,7 +2522,7 @@
             <a:fld id="{AC52CBD9-6304-444B-95DF-80988D1CE7EB}" type="datetimeFigureOut">
               <a:rPr lang="en-US" smtClean="0"/>
               <a:pPr/>
-              <a:t>11/13/2010</a:t>
+              <a:t>11/20/2010</a:t>
             </a:fld>
             <a:endParaRPr lang="en-US"/>
           </a:p>
@@ -2781,7 +2782,7 @@
             <a:fld id="{AC52CBD9-6304-444B-95DF-80988D1CE7EB}" type="datetimeFigureOut">
               <a:rPr lang="en-US" smtClean="0"/>
               <a:pPr/>
-              <a:t>11/13/2010</a:t>
+              <a:t>11/20/2010</a:t>
             </a:fld>
             <a:endParaRPr lang="en-US"/>
           </a:p>
@@ -3047,7 +3048,7 @@
             <a:fld id="{AC52CBD9-6304-444B-95DF-80988D1CE7EB}" type="datetimeFigureOut">
               <a:rPr lang="en-US" smtClean="0"/>
               <a:pPr/>
-              <a:t>11/13/2010</a:t>
+              <a:t>11/20/2010</a:t>
             </a:fld>
             <a:endParaRPr lang="en-US"/>
           </a:p>
@@ -3269,7 +3270,7 @@
             <a:fld id="{AC52CBD9-6304-444B-95DF-80988D1CE7EB}" type="datetimeFigureOut">
               <a:rPr lang="en-US" smtClean="0"/>
               <a:pPr/>
-              <a:t>11/13/2010</a:t>
+              <a:t>11/20/2010</a:t>
             </a:fld>
             <a:endParaRPr lang="en-US"/>
           </a:p>
@@ -4693,6 +4694,164 @@
     <p:extLst>
       <p:ext uri="{BB962C8B-B14F-4D97-AF65-F5344CB8AC3E}">
         <p14:creationId xmlns:p14="http://schemas.microsoft.com/office/powerpoint/2010/main" val="3644785902"/>
+      </p:ext>
+    </p:extLst>
+  </p:cSld>
+  <p:clrMapOvr>
+    <a:masterClrMapping/>
+  </p:clrMapOvr>
+</p:sld>
+</file>
+
+<file path=ppt/slides/slide7.xml><?xml version="1.0" encoding="utf-8"?>
+<p:sld xmlns:a="http://schemas.openxmlformats.org/drawingml/2006/main" xmlns:r="http://schemas.openxmlformats.org/officeDocument/2006/relationships" xmlns:p="http://schemas.openxmlformats.org/presentationml/2006/main">
+  <p:cSld>
+    <p:spTree>
+      <p:nvGrpSpPr>
+        <p:cNvPr id="1" name=""/>
+        <p:cNvGrpSpPr/>
+        <p:nvPr/>
+      </p:nvGrpSpPr>
+      <p:grpSpPr>
+        <a:xfrm>
+          <a:off x="0" y="0"/>
+          <a:ext cx="0" cy="0"/>
+          <a:chOff x="0" y="0"/>
+          <a:chExt cx="0" cy="0"/>
+        </a:xfrm>
+      </p:grpSpPr>
+      <p:sp>
+        <p:nvSpPr>
+          <p:cNvPr id="2" name="Title 1"/>
+          <p:cNvSpPr>
+            <a:spLocks noGrp="1"/>
+          </p:cNvSpPr>
+          <p:nvPr>
+            <p:ph type="title"/>
+          </p:nvPr>
+        </p:nvSpPr>
+        <p:spPr/>
+        <p:txBody>
+          <a:bodyPr/>
+          <a:lstStyle/>
+          <a:p>
+            <a:r>
+              <a:rPr lang="sv-SE" dirty="0"/>
+              <a:t>www.codinginstinct.com</a:t>
+            </a:r>
+          </a:p>
+        </p:txBody>
+      </p:sp>
+      <p:sp>
+        <p:nvSpPr>
+          <p:cNvPr id="3" name="Content Placeholder 2"/>
+          <p:cNvSpPr>
+            <a:spLocks noGrp="1"/>
+          </p:cNvSpPr>
+          <p:nvPr>
+            <p:ph idx="1"/>
+          </p:nvPr>
+        </p:nvSpPr>
+        <p:spPr/>
+        <p:txBody>
+          <a:bodyPr>
+            <a:normAutofit/>
+          </a:bodyPr>
+          <a:lstStyle/>
+          <a:p>
+            <a:endParaRPr lang="sv-SE" dirty="0" smtClean="0">
+              <a:solidFill>
+                <a:srgbClr val="FF0000"/>
+              </a:solidFill>
+            </a:endParaRPr>
+          </a:p>
+          <a:p>
+            <a:r>
+              <a:rPr lang="sv-SE" sz="1600" dirty="0" smtClean="0"/>
+              <a:t>http://</a:t>
+            </a:r>
+            <a:r>
+              <a:rPr lang="sv-SE" sz="1600" dirty="0"/>
+              <a:t>github.com/torkelo/pimpmycode</a:t>
+            </a:r>
+            <a:endParaRPr lang="sv-SE" sz="1600" dirty="0" smtClean="0"/>
+          </a:p>
+          <a:p>
+            <a:endParaRPr lang="sv-SE" sz="1600" dirty="0" smtClean="0"/>
+          </a:p>
+          <a:p>
+            <a:r>
+              <a:rPr lang="sv-SE" sz="1600" dirty="0" smtClean="0"/>
+              <a:t>MSDN Article: Design For Convention Over Configuration </a:t>
+            </a:r>
+            <a:r>
+              <a:rPr lang="sv-SE" sz="1600" dirty="0"/>
+              <a:t>– (Jeremy D Miller)</a:t>
+            </a:r>
+            <a:endParaRPr lang="sv-SE" sz="1600" dirty="0" smtClean="0"/>
+          </a:p>
+          <a:p>
+            <a:pPr lvl="1"/>
+            <a:r>
+              <a:rPr lang="sv-SE" sz="1600" dirty="0"/>
+              <a:t>http://msdn.microsoft.com/en-us/magazine/dd419655.aspx</a:t>
+            </a:r>
+            <a:endParaRPr lang="sv-SE" sz="1600" dirty="0" smtClean="0"/>
+          </a:p>
+          <a:p>
+            <a:endParaRPr lang="sv-SE" sz="1600" dirty="0" smtClean="0"/>
+          </a:p>
+          <a:p>
+            <a:r>
+              <a:rPr lang="sv-SE" sz="1600" dirty="0" smtClean="0"/>
+              <a:t>Build Your Own MVVM Framework (</a:t>
+            </a:r>
+            <a:r>
+              <a:rPr lang="sv-SE" sz="1600" dirty="0"/>
+              <a:t>Rob </a:t>
+            </a:r>
+            <a:r>
+              <a:rPr lang="sv-SE" sz="1600" dirty="0" smtClean="0"/>
+              <a:t>Eisenberg)</a:t>
+            </a:r>
+          </a:p>
+          <a:p>
+            <a:pPr lvl="1"/>
+            <a:r>
+              <a:rPr lang="sv-SE" sz="1600" dirty="0" smtClean="0"/>
+              <a:t>http</a:t>
+            </a:r>
+            <a:r>
+              <a:rPr lang="sv-SE" sz="1600" dirty="0"/>
+              <a:t>://</a:t>
+            </a:r>
+            <a:r>
+              <a:rPr lang="sv-SE" sz="1600" dirty="0" smtClean="0"/>
+              <a:t>live.visitmix.com/MIX10/Sessions/EX15</a:t>
+            </a:r>
+          </a:p>
+          <a:p>
+            <a:endParaRPr lang="sv-SE" sz="2000" dirty="0" smtClean="0"/>
+          </a:p>
+          <a:p>
+            <a:r>
+              <a:rPr lang="sv-SE" sz="2000" dirty="0" smtClean="0"/>
+              <a:t>Caliburn Micro </a:t>
+            </a:r>
+          </a:p>
+          <a:p>
+            <a:pPr lvl="1"/>
+            <a:r>
+              <a:rPr lang="sv-SE" sz="1600" dirty="0"/>
+              <a:t>http://caliburnmicro.codeplex.com/</a:t>
+            </a:r>
+          </a:p>
+        </p:txBody>
+      </p:sp>
+    </p:spTree>
+    <p:extLst>
+      <p:ext uri="{BB962C8B-B14F-4D97-AF65-F5344CB8AC3E}">
+        <p14:creationId xmlns:p14="http://schemas.microsoft.com/office/powerpoint/2010/main" val="2303371641"/>
       </p:ext>
     </p:extLst>
   </p:cSld>

</xml_diff>

<commit_message>
end state after pimp my code in gothenburg
</commit_message>
<xml_diff>
--- a/docs/convention_over_configuration.pptx
+++ b/docs/convention_over_configuration.pptx
@@ -5,13 +5,14 @@
     <p:sldMasterId id="2147483684" r:id="rId1"/>
   </p:sldMasterIdLst>
   <p:notesMasterIdLst>
-    <p:notesMasterId r:id="rId6"/>
+    <p:notesMasterId r:id="rId7"/>
   </p:notesMasterIdLst>
   <p:sldIdLst>
     <p:sldId id="287" r:id="rId2"/>
     <p:sldId id="294" r:id="rId3"/>
     <p:sldId id="292" r:id="rId4"/>
-    <p:sldId id="293" r:id="rId5"/>
+    <p:sldId id="295" r:id="rId5"/>
+    <p:sldId id="293" r:id="rId6"/>
   </p:sldIdLst>
   <p:sldSz cx="9144000" cy="6858000" type="screen4x3"/>
   <p:notesSz cx="6858000" cy="9144000"/>
@@ -196,7 +197,7 @@
             <a:fld id="{DE2A99C0-0CF4-426E-9D6D-1394ADDD28E9}" type="datetimeFigureOut">
               <a:rPr lang="en-US" smtClean="0"/>
               <a:pPr/>
-              <a:t>11/18/2010</a:t>
+              <a:t>11/20/2010</a:t>
             </a:fld>
             <a:endParaRPr lang="en-US"/>
           </a:p>
@@ -661,7 +662,7 @@
             <a:fld id="{AC52CBD9-6304-444B-95DF-80988D1CE7EB}" type="datetimeFigureOut">
               <a:rPr lang="en-US" smtClean="0"/>
               <a:pPr/>
-              <a:t>11/18/2010</a:t>
+              <a:t>11/20/2010</a:t>
             </a:fld>
             <a:endParaRPr lang="en-US"/>
           </a:p>
@@ -889,7 +890,7 @@
             <a:fld id="{AC52CBD9-6304-444B-95DF-80988D1CE7EB}" type="datetimeFigureOut">
               <a:rPr lang="en-US" smtClean="0"/>
               <a:pPr/>
-              <a:t>11/18/2010</a:t>
+              <a:t>11/20/2010</a:t>
             </a:fld>
             <a:endParaRPr lang="en-US"/>
           </a:p>
@@ -1066,7 +1067,7 @@
             <a:fld id="{AC52CBD9-6304-444B-95DF-80988D1CE7EB}" type="datetimeFigureOut">
               <a:rPr lang="en-US" smtClean="0"/>
               <a:pPr/>
-              <a:t>11/18/2010</a:t>
+              <a:t>11/20/2010</a:t>
             </a:fld>
             <a:endParaRPr lang="en-US"/>
           </a:p>
@@ -1259,7 +1260,7 @@
             <a:fld id="{AC52CBD9-6304-444B-95DF-80988D1CE7EB}" type="datetimeFigureOut">
               <a:rPr lang="en-US" smtClean="0"/>
               <a:pPr/>
-              <a:t>11/18/2010</a:t>
+              <a:t>11/20/2010</a:t>
             </a:fld>
             <a:endParaRPr lang="en-US"/>
           </a:p>
@@ -1500,7 +1501,7 @@
             <a:fld id="{AC52CBD9-6304-444B-95DF-80988D1CE7EB}" type="datetimeFigureOut">
               <a:rPr lang="en-US" smtClean="0"/>
               <a:pPr/>
-              <a:t>11/18/2010</a:t>
+              <a:t>11/20/2010</a:t>
             </a:fld>
             <a:endParaRPr lang="en-US"/>
           </a:p>
@@ -1766,7 +1767,7 @@
             <a:fld id="{AC52CBD9-6304-444B-95DF-80988D1CE7EB}" type="datetimeFigureOut">
               <a:rPr lang="en-US" smtClean="0"/>
               <a:pPr/>
-              <a:t>11/18/2010</a:t>
+              <a:t>11/20/2010</a:t>
             </a:fld>
             <a:endParaRPr lang="en-US"/>
           </a:p>
@@ -2142,7 +2143,7 @@
             <a:fld id="{AC52CBD9-6304-444B-95DF-80988D1CE7EB}" type="datetimeFigureOut">
               <a:rPr lang="en-US" smtClean="0"/>
               <a:pPr/>
-              <a:t>11/18/2010</a:t>
+              <a:t>11/20/2010</a:t>
             </a:fld>
             <a:endParaRPr lang="en-US"/>
           </a:p>
@@ -2257,7 +2258,7 @@
             <a:fld id="{AC52CBD9-6304-444B-95DF-80988D1CE7EB}" type="datetimeFigureOut">
               <a:rPr lang="en-US" smtClean="0"/>
               <a:pPr/>
-              <a:t>11/18/2010</a:t>
+              <a:t>11/20/2010</a:t>
             </a:fld>
             <a:endParaRPr lang="en-US"/>
           </a:p>
@@ -2349,7 +2350,7 @@
             <a:fld id="{AC52CBD9-6304-444B-95DF-80988D1CE7EB}" type="datetimeFigureOut">
               <a:rPr lang="en-US" smtClean="0"/>
               <a:pPr/>
-              <a:t>11/18/2010</a:t>
+              <a:t>11/20/2010</a:t>
             </a:fld>
             <a:endParaRPr lang="en-US"/>
           </a:p>
@@ -2609,7 +2610,7 @@
             <a:fld id="{AC52CBD9-6304-444B-95DF-80988D1CE7EB}" type="datetimeFigureOut">
               <a:rPr lang="en-US" smtClean="0"/>
               <a:pPr/>
-              <a:t>11/18/2010</a:t>
+              <a:t>11/20/2010</a:t>
             </a:fld>
             <a:endParaRPr lang="en-US"/>
           </a:p>
@@ -2875,7 +2876,7 @@
             <a:fld id="{AC52CBD9-6304-444B-95DF-80988D1CE7EB}" type="datetimeFigureOut">
               <a:rPr lang="en-US" smtClean="0"/>
               <a:pPr/>
-              <a:t>11/18/2010</a:t>
+              <a:t>11/20/2010</a:t>
             </a:fld>
             <a:endParaRPr lang="en-US"/>
           </a:p>
@@ -3097,7 +3098,7 @@
             <a:fld id="{AC52CBD9-6304-444B-95DF-80988D1CE7EB}" type="datetimeFigureOut">
               <a:rPr lang="en-US" smtClean="0"/>
               <a:pPr/>
-              <a:t>11/18/2010</a:t>
+              <a:t>11/20/2010</a:t>
             </a:fld>
             <a:endParaRPr lang="en-US"/>
           </a:p>
@@ -4079,74 +4080,6 @@
           </a:p>
         </p:txBody>
       </p:sp>
-      <p:sp>
-        <p:nvSpPr>
-          <p:cNvPr id="25" name="Rectangle 24"/>
-          <p:cNvSpPr/>
-          <p:nvPr/>
-        </p:nvSpPr>
-        <p:spPr>
-          <a:xfrm>
-            <a:off x="338014" y="3131295"/>
-            <a:ext cx="3456384" cy="576064"/>
-          </a:xfrm>
-          <a:prstGeom prst="rect">
-            <a:avLst/>
-          </a:prstGeom>
-          <a:noFill/>
-          <a:ln>
-            <a:noFill/>
-          </a:ln>
-        </p:spPr>
-        <p:style>
-          <a:lnRef idx="2">
-            <a:schemeClr val="accent4">
-              <a:shade val="50000"/>
-            </a:schemeClr>
-          </a:lnRef>
-          <a:fillRef idx="1">
-            <a:schemeClr val="accent4"/>
-          </a:fillRef>
-          <a:effectRef idx="0">
-            <a:schemeClr val="accent4"/>
-          </a:effectRef>
-          <a:fontRef idx="minor">
-            <a:schemeClr val="lt1"/>
-          </a:fontRef>
-        </p:style>
-        <p:txBody>
-          <a:bodyPr rtlCol="0" anchor="ctr"/>
-          <a:lstStyle/>
-          <a:p>
-            <a:pPr algn="ctr"/>
-            <a:r>
-              <a:rPr lang="sv-SE" dirty="0" smtClean="0">
-                <a:latin typeface="Consolas" pitchFamily="49" charset="0"/>
-                <a:cs typeface="Consolas" pitchFamily="49" charset="0"/>
-              </a:rPr>
-              <a:t>”/</a:t>
-            </a:r>
-            <a:r>
-              <a:rPr lang="sv-SE" sz="2000" dirty="0" smtClean="0">
-                <a:latin typeface="Consolas" pitchFamily="49" charset="0"/>
-                <a:cs typeface="Consolas" pitchFamily="49" charset="0"/>
-              </a:rPr>
-              <a:t>UserAdmin/Edit/2</a:t>
-            </a:r>
-            <a:r>
-              <a:rPr lang="sv-SE" dirty="0" smtClean="0">
-                <a:latin typeface="Consolas" pitchFamily="49" charset="0"/>
-                <a:cs typeface="Consolas" pitchFamily="49" charset="0"/>
-              </a:rPr>
-              <a:t>”</a:t>
-            </a:r>
-            <a:endParaRPr lang="en-US" dirty="0">
-              <a:latin typeface="Consolas" pitchFamily="49" charset="0"/>
-              <a:cs typeface="Consolas" pitchFamily="49" charset="0"/>
-            </a:endParaRPr>
-          </a:p>
-        </p:txBody>
-      </p:sp>
       <p:cxnSp>
         <p:nvCxnSpPr>
           <p:cNvPr id="26" name="Straight Arrow Connector 25"/>
@@ -4155,7 +4088,7 @@
         </p:nvCxnSpPr>
         <p:spPr>
           <a:xfrm>
-            <a:off x="3794398" y="3456211"/>
+            <a:off x="4215978" y="3456211"/>
             <a:ext cx="1008112" cy="0"/>
           </a:xfrm>
           <a:prstGeom prst="straightConnector1">
@@ -4303,6 +4236,67 @@
               <a:t> Database table </a:t>
             </a:r>
             <a:endParaRPr lang="en-US" sz="2400" dirty="0"/>
+          </a:p>
+        </p:txBody>
+      </p:sp>
+      <p:sp>
+        <p:nvSpPr>
+          <p:cNvPr id="17" name="Rectangle 16"/>
+          <p:cNvSpPr/>
+          <p:nvPr/>
+        </p:nvSpPr>
+        <p:spPr>
+          <a:xfrm>
+            <a:off x="0" y="3125715"/>
+            <a:ext cx="4027636" cy="576064"/>
+          </a:xfrm>
+          <a:prstGeom prst="rect">
+            <a:avLst/>
+          </a:prstGeom>
+          <a:noFill/>
+          <a:ln>
+            <a:noFill/>
+          </a:ln>
+        </p:spPr>
+        <p:style>
+          <a:lnRef idx="2">
+            <a:schemeClr val="accent4">
+              <a:shade val="50000"/>
+            </a:schemeClr>
+          </a:lnRef>
+          <a:fillRef idx="1">
+            <a:schemeClr val="accent4"/>
+          </a:fillRef>
+          <a:effectRef idx="0">
+            <a:schemeClr val="accent4"/>
+          </a:effectRef>
+          <a:fontRef idx="minor">
+            <a:schemeClr val="lt1"/>
+          </a:fontRef>
+        </p:style>
+        <p:txBody>
+          <a:bodyPr rtlCol="0" anchor="ctr"/>
+          <a:lstStyle/>
+          <a:p>
+            <a:pPr algn="ctr"/>
+            <a:r>
+              <a:rPr lang="sv-SE" sz="2000" dirty="0" smtClean="0">
+                <a:latin typeface="Consolas" pitchFamily="49" charset="0"/>
+                <a:cs typeface="Consolas" pitchFamily="49" charset="0"/>
+              </a:rPr>
+              <a:t>UserAdminController.Edit(2</a:t>
+            </a:r>
+            <a:r>
+              <a:rPr lang="sv-SE" dirty="0" smtClean="0">
+                <a:latin typeface="Consolas" pitchFamily="49" charset="0"/>
+                <a:cs typeface="Consolas" pitchFamily="49" charset="0"/>
+              </a:rPr>
+              <a:t>)</a:t>
+            </a:r>
+            <a:endParaRPr lang="en-US" dirty="0">
+              <a:latin typeface="Consolas" pitchFamily="49" charset="0"/>
+              <a:cs typeface="Consolas" pitchFamily="49" charset="0"/>
+            </a:endParaRPr>
           </a:p>
         </p:txBody>
       </p:sp>
@@ -4495,7 +4489,7 @@
                             </p:stCondLst>
                             <p:childTnLst>
                               <p:par>
-                                <p:cTn id="19" presetID="10" presetClass="entr" presetSubtype="0" fill="hold" grpId="0" nodeType="clickEffect">
+                                <p:cTn id="19" presetID="10" presetClass="entr" presetSubtype="0" fill="hold" nodeType="clickEffect">
                                   <p:stCondLst>
                                     <p:cond delay="0"/>
                                   </p:stCondLst>
@@ -4508,7 +4502,7 @@
                                           </p:stCondLst>
                                         </p:cTn>
                                         <p:tgtEl>
-                                          <p:spTgt spid="25"/>
+                                          <p:spTgt spid="26"/>
                                         </p:tgtEl>
                                         <p:attrNameLst>
                                           <p:attrName>style.visibility</p:attrName>
@@ -4522,7 +4516,7 @@
                                       <p:cBhvr>
                                         <p:cTn id="21" dur="500"/>
                                         <p:tgtEl>
-                                          <p:spTgt spid="25"/>
+                                          <p:spTgt spid="26"/>
                                         </p:tgtEl>
                                       </p:cBhvr>
                                     </p:animEffect>
@@ -4543,7 +4537,7 @@
                                           </p:stCondLst>
                                         </p:cTn>
                                         <p:tgtEl>
-                                          <p:spTgt spid="28"/>
+                                          <p:spTgt spid="27"/>
                                         </p:tgtEl>
                                         <p:attrNameLst>
                                           <p:attrName>style.visibility</p:attrName>
@@ -4557,7 +4551,7 @@
                                       <p:cBhvr>
                                         <p:cTn id="24" dur="500"/>
                                         <p:tgtEl>
-                                          <p:spTgt spid="28"/>
+                                          <p:spTgt spid="27"/>
                                         </p:tgtEl>
                                       </p:cBhvr>
                                     </p:animEffect>
@@ -4565,7 +4559,7 @@
                                 </p:cTn>
                               </p:par>
                               <p:par>
-                                <p:cTn id="25" presetID="10" presetClass="entr" presetSubtype="0" fill="hold" nodeType="withEffect">
+                                <p:cTn id="25" presetID="10" presetClass="entr" presetSubtype="0" fill="hold" grpId="0" nodeType="withEffect">
                                   <p:stCondLst>
                                     <p:cond delay="0"/>
                                   </p:stCondLst>
@@ -4578,7 +4572,7 @@
                                           </p:stCondLst>
                                         </p:cTn>
                                         <p:tgtEl>
-                                          <p:spTgt spid="26"/>
+                                          <p:spTgt spid="28"/>
                                         </p:tgtEl>
                                         <p:attrNameLst>
                                           <p:attrName>style.visibility</p:attrName>
@@ -4592,7 +4586,7 @@
                                       <p:cBhvr>
                                         <p:cTn id="27" dur="500"/>
                                         <p:tgtEl>
-                                          <p:spTgt spid="26"/>
+                                          <p:spTgt spid="28"/>
                                         </p:tgtEl>
                                       </p:cBhvr>
                                     </p:animEffect>
@@ -4613,7 +4607,7 @@
                                           </p:stCondLst>
                                         </p:cTn>
                                         <p:tgtEl>
-                                          <p:spTgt spid="27"/>
+                                          <p:spTgt spid="17"/>
                                         </p:tgtEl>
                                         <p:attrNameLst>
                                           <p:attrName>style.visibility</p:attrName>
@@ -4627,7 +4621,7 @@
                                       <p:cBhvr>
                                         <p:cTn id="30" dur="500"/>
                                         <p:tgtEl>
-                                          <p:spTgt spid="27"/>
+                                          <p:spTgt spid="17"/>
                                         </p:tgtEl>
                                       </p:cBhvr>
                                     </p:animEffect>
@@ -4736,7 +4730,7 @@
                                           </p:stCondLst>
                                         </p:cTn>
                                         <p:tgtEl>
-                                          <p:spTgt spid="29"/>
+                                          <p:spTgt spid="15"/>
                                         </p:tgtEl>
                                         <p:attrNameLst>
                                           <p:attrName>style.visibility</p:attrName>
@@ -4750,7 +4744,7 @@
                                       <p:cBhvr>
                                         <p:cTn id="41" dur="500"/>
                                         <p:tgtEl>
-                                          <p:spTgt spid="29"/>
+                                          <p:spTgt spid="15"/>
                                         </p:tgtEl>
                                       </p:cBhvr>
                                     </p:animEffect>
@@ -4771,7 +4765,7 @@
                                           </p:stCondLst>
                                         </p:cTn>
                                         <p:tgtEl>
-                                          <p:spTgt spid="15"/>
+                                          <p:spTgt spid="29"/>
                                         </p:tgtEl>
                                         <p:attrNameLst>
                                           <p:attrName>style.visibility</p:attrName>
@@ -4785,7 +4779,7 @@
                                       <p:cBhvr>
                                         <p:cTn id="44" dur="500"/>
                                         <p:tgtEl>
-                                          <p:spTgt spid="15"/>
+                                          <p:spTgt spid="29"/>
                                         </p:tgtEl>
                                       </p:cBhvr>
                                     </p:animEffect>
@@ -4825,10 +4819,10 @@
       <p:bldP spid="11" grpId="0"/>
       <p:bldP spid="15" grpId="0"/>
       <p:bldP spid="22" grpId="0"/>
-      <p:bldP spid="25" grpId="0"/>
       <p:bldP spid="27" grpId="0"/>
       <p:bldP spid="28" grpId="0"/>
       <p:bldP spid="29" grpId="0"/>
+      <p:bldP spid="17" grpId="0"/>
     </p:bldLst>
   </p:timing>
 </p:sld>
@@ -4946,12 +4940,509 @@
           <a:lstStyle/>
           <a:p>
             <a:r>
-              <a:rPr lang="sv-SE" dirty="0"/>
-              <a:t>www.codinginstinct.com</a:t>
-            </a:r>
-          </a:p>
-        </p:txBody>
-      </p:sp>
+              <a:rPr lang="sv-SE" dirty="0" smtClean="0"/>
+              <a:t>MVVM</a:t>
+            </a:r>
+            <a:endParaRPr lang="en-US" dirty="0"/>
+          </a:p>
+        </p:txBody>
+      </p:sp>
+      <p:sp>
+        <p:nvSpPr>
+          <p:cNvPr id="4" name="Rectangle 3"/>
+          <p:cNvSpPr/>
+          <p:nvPr/>
+        </p:nvSpPr>
+        <p:spPr>
+          <a:xfrm>
+            <a:off x="251520" y="1778798"/>
+            <a:ext cx="3312368" cy="3096344"/>
+          </a:xfrm>
+          <a:prstGeom prst="rect">
+            <a:avLst/>
+          </a:prstGeom>
+        </p:spPr>
+        <p:style>
+          <a:lnRef idx="1">
+            <a:schemeClr val="accent3"/>
+          </a:lnRef>
+          <a:fillRef idx="3">
+            <a:schemeClr val="accent3"/>
+          </a:fillRef>
+          <a:effectRef idx="2">
+            <a:schemeClr val="accent3"/>
+          </a:effectRef>
+          <a:fontRef idx="minor">
+            <a:schemeClr val="lt1"/>
+          </a:fontRef>
+        </p:style>
+        <p:txBody>
+          <a:bodyPr rtlCol="0" anchor="t"/>
+          <a:lstStyle/>
+          <a:p>
+            <a:r>
+              <a:rPr lang="sv-SE" sz="1600" dirty="0" smtClean="0">
+                <a:solidFill>
+                  <a:schemeClr val="bg1"/>
+                </a:solidFill>
+                <a:latin typeface="Consolas" pitchFamily="49" charset="0"/>
+                <a:cs typeface="Consolas" pitchFamily="49" charset="0"/>
+              </a:rPr>
+              <a:t>&lt;StackPanel&gt;</a:t>
+            </a:r>
+          </a:p>
+          <a:p>
+            <a:r>
+              <a:rPr lang="sv-SE" sz="1600" dirty="0">
+                <a:solidFill>
+                  <a:schemeClr val="bg1"/>
+                </a:solidFill>
+                <a:latin typeface="Consolas" pitchFamily="49" charset="0"/>
+                <a:cs typeface="Consolas" pitchFamily="49" charset="0"/>
+              </a:rPr>
+              <a:t> </a:t>
+            </a:r>
+            <a:r>
+              <a:rPr lang="sv-SE" sz="1600" dirty="0" smtClean="0">
+                <a:solidFill>
+                  <a:schemeClr val="bg1"/>
+                </a:solidFill>
+                <a:latin typeface="Consolas" pitchFamily="49" charset="0"/>
+                <a:cs typeface="Consolas" pitchFamily="49" charset="0"/>
+              </a:rPr>
+              <a:t> &lt;TextBlock</a:t>
+            </a:r>
+          </a:p>
+          <a:p>
+            <a:r>
+              <a:rPr lang="sv-SE" sz="1600" dirty="0" smtClean="0">
+                <a:solidFill>
+                  <a:schemeClr val="bg1"/>
+                </a:solidFill>
+                <a:latin typeface="Consolas" pitchFamily="49" charset="0"/>
+                <a:cs typeface="Consolas" pitchFamily="49" charset="0"/>
+              </a:rPr>
+              <a:t>     Text={Binding Title}&gt;</a:t>
+            </a:r>
+          </a:p>
+          <a:p>
+            <a:r>
+              <a:rPr lang="sv-SE" sz="1600" dirty="0" smtClean="0">
+                <a:solidFill>
+                  <a:schemeClr val="bg1"/>
+                </a:solidFill>
+                <a:latin typeface="Consolas" pitchFamily="49" charset="0"/>
+                <a:cs typeface="Consolas" pitchFamily="49" charset="0"/>
+              </a:rPr>
+              <a:t>  </a:t>
+            </a:r>
+          </a:p>
+          <a:p>
+            <a:r>
+              <a:rPr lang="sv-SE" sz="1600" dirty="0">
+                <a:solidFill>
+                  <a:schemeClr val="bg1"/>
+                </a:solidFill>
+                <a:latin typeface="Consolas" pitchFamily="49" charset="0"/>
+                <a:cs typeface="Consolas" pitchFamily="49" charset="0"/>
+              </a:rPr>
+              <a:t> </a:t>
+            </a:r>
+            <a:r>
+              <a:rPr lang="sv-SE" sz="1600" dirty="0" smtClean="0">
+                <a:solidFill>
+                  <a:schemeClr val="bg1"/>
+                </a:solidFill>
+                <a:latin typeface="Consolas" pitchFamily="49" charset="0"/>
+                <a:cs typeface="Consolas" pitchFamily="49" charset="0"/>
+              </a:rPr>
+              <a:t> &lt;Button&gt;Delete&lt;/Button&gt; </a:t>
+            </a:r>
+            <a:endParaRPr lang="sv-SE" sz="1600" dirty="0">
+              <a:solidFill>
+                <a:schemeClr val="bg1"/>
+              </a:solidFill>
+              <a:latin typeface="Consolas" pitchFamily="49" charset="0"/>
+              <a:cs typeface="Consolas" pitchFamily="49" charset="0"/>
+            </a:endParaRPr>
+          </a:p>
+          <a:p>
+            <a:r>
+              <a:rPr lang="sv-SE" sz="1600" dirty="0" smtClean="0">
+                <a:solidFill>
+                  <a:schemeClr val="bg1"/>
+                </a:solidFill>
+                <a:latin typeface="Consolas" pitchFamily="49" charset="0"/>
+                <a:cs typeface="Consolas" pitchFamily="49" charset="0"/>
+              </a:rPr>
+              <a:t>&lt;/StackPanel&gt;</a:t>
+            </a:r>
+            <a:endParaRPr lang="en-US" sz="1600" dirty="0">
+              <a:solidFill>
+                <a:schemeClr val="bg1"/>
+              </a:solidFill>
+              <a:latin typeface="Consolas" pitchFamily="49" charset="0"/>
+              <a:cs typeface="Consolas" pitchFamily="49" charset="0"/>
+            </a:endParaRPr>
+          </a:p>
+        </p:txBody>
+      </p:sp>
+      <p:sp>
+        <p:nvSpPr>
+          <p:cNvPr id="5" name="Rectangle 4"/>
+          <p:cNvSpPr/>
+          <p:nvPr/>
+        </p:nvSpPr>
+        <p:spPr>
+          <a:xfrm>
+            <a:off x="4932040" y="1844824"/>
+            <a:ext cx="3960440" cy="3096344"/>
+          </a:xfrm>
+          <a:prstGeom prst="rect">
+            <a:avLst/>
+          </a:prstGeom>
+        </p:spPr>
+        <p:style>
+          <a:lnRef idx="1">
+            <a:schemeClr val="accent3"/>
+          </a:lnRef>
+          <a:fillRef idx="3">
+            <a:schemeClr val="accent3"/>
+          </a:fillRef>
+          <a:effectRef idx="2">
+            <a:schemeClr val="accent3"/>
+          </a:effectRef>
+          <a:fontRef idx="minor">
+            <a:schemeClr val="lt1"/>
+          </a:fontRef>
+        </p:style>
+        <p:txBody>
+          <a:bodyPr rtlCol="0" anchor="t"/>
+          <a:lstStyle/>
+          <a:p>
+            <a:r>
+              <a:rPr lang="sv-SE" sz="1600" dirty="0" smtClean="0">
+                <a:solidFill>
+                  <a:schemeClr val="bg1"/>
+                </a:solidFill>
+                <a:latin typeface="Consolas" pitchFamily="49" charset="0"/>
+                <a:cs typeface="Consolas" pitchFamily="49" charset="0"/>
+              </a:rPr>
+              <a:t>Public class ViewModel</a:t>
+            </a:r>
+          </a:p>
+          <a:p>
+            <a:r>
+              <a:rPr lang="sv-SE" sz="1600" dirty="0" smtClean="0">
+                <a:solidFill>
+                  <a:schemeClr val="bg1"/>
+                </a:solidFill>
+                <a:latin typeface="Consolas" pitchFamily="49" charset="0"/>
+                <a:cs typeface="Consolas" pitchFamily="49" charset="0"/>
+              </a:rPr>
+              <a:t>{</a:t>
+            </a:r>
+          </a:p>
+          <a:p>
+            <a:r>
+              <a:rPr lang="sv-SE" sz="1600" dirty="0" smtClean="0">
+                <a:solidFill>
+                  <a:schemeClr val="bg1"/>
+                </a:solidFill>
+                <a:latin typeface="Consolas" pitchFamily="49" charset="0"/>
+                <a:cs typeface="Consolas" pitchFamily="49" charset="0"/>
+              </a:rPr>
+              <a:t>    public string Text {get;set;}</a:t>
+            </a:r>
+          </a:p>
+          <a:p>
+            <a:endParaRPr lang="sv-SE" sz="1600" dirty="0">
+              <a:solidFill>
+                <a:schemeClr val="bg1"/>
+              </a:solidFill>
+              <a:latin typeface="Consolas" pitchFamily="49" charset="0"/>
+              <a:cs typeface="Consolas" pitchFamily="49" charset="0"/>
+            </a:endParaRPr>
+          </a:p>
+          <a:p>
+            <a:r>
+              <a:rPr lang="sv-SE" sz="1600" dirty="0" smtClean="0">
+                <a:solidFill>
+                  <a:schemeClr val="bg1"/>
+                </a:solidFill>
+                <a:latin typeface="Consolas" pitchFamily="49" charset="0"/>
+                <a:cs typeface="Consolas" pitchFamily="49" charset="0"/>
+              </a:rPr>
+              <a:t>    public void Delete()</a:t>
+            </a:r>
+          </a:p>
+          <a:p>
+            <a:r>
+              <a:rPr lang="sv-SE" sz="1600" dirty="0">
+                <a:solidFill>
+                  <a:schemeClr val="bg1"/>
+                </a:solidFill>
+                <a:latin typeface="Consolas" pitchFamily="49" charset="0"/>
+                <a:cs typeface="Consolas" pitchFamily="49" charset="0"/>
+              </a:rPr>
+              <a:t> </a:t>
+            </a:r>
+            <a:r>
+              <a:rPr lang="sv-SE" sz="1600" dirty="0" smtClean="0">
+                <a:solidFill>
+                  <a:schemeClr val="bg1"/>
+                </a:solidFill>
+                <a:latin typeface="Consolas" pitchFamily="49" charset="0"/>
+                <a:cs typeface="Consolas" pitchFamily="49" charset="0"/>
+              </a:rPr>
+              <a:t>   {</a:t>
+            </a:r>
+          </a:p>
+          <a:p>
+            <a:r>
+              <a:rPr lang="sv-SE" sz="1600" dirty="0">
+                <a:solidFill>
+                  <a:schemeClr val="bg1"/>
+                </a:solidFill>
+                <a:latin typeface="Consolas" pitchFamily="49" charset="0"/>
+                <a:cs typeface="Consolas" pitchFamily="49" charset="0"/>
+              </a:rPr>
+              <a:t> </a:t>
+            </a:r>
+            <a:r>
+              <a:rPr lang="sv-SE" sz="1600" dirty="0" smtClean="0">
+                <a:solidFill>
+                  <a:schemeClr val="bg1"/>
+                </a:solidFill>
+                <a:latin typeface="Consolas" pitchFamily="49" charset="0"/>
+                <a:cs typeface="Consolas" pitchFamily="49" charset="0"/>
+              </a:rPr>
+              <a:t>   </a:t>
+            </a:r>
+          </a:p>
+          <a:p>
+            <a:r>
+              <a:rPr lang="sv-SE" sz="1600" dirty="0">
+                <a:solidFill>
+                  <a:schemeClr val="bg1"/>
+                </a:solidFill>
+                <a:latin typeface="Consolas" pitchFamily="49" charset="0"/>
+                <a:cs typeface="Consolas" pitchFamily="49" charset="0"/>
+              </a:rPr>
+              <a:t> </a:t>
+            </a:r>
+            <a:r>
+              <a:rPr lang="sv-SE" sz="1600" dirty="0" smtClean="0">
+                <a:solidFill>
+                  <a:schemeClr val="bg1"/>
+                </a:solidFill>
+                <a:latin typeface="Consolas" pitchFamily="49" charset="0"/>
+                <a:cs typeface="Consolas" pitchFamily="49" charset="0"/>
+              </a:rPr>
+              <a:t>   }</a:t>
+            </a:r>
+            <a:endParaRPr lang="sv-SE" sz="1600" dirty="0">
+              <a:solidFill>
+                <a:schemeClr val="bg1"/>
+              </a:solidFill>
+              <a:latin typeface="Consolas" pitchFamily="49" charset="0"/>
+              <a:cs typeface="Consolas" pitchFamily="49" charset="0"/>
+            </a:endParaRPr>
+          </a:p>
+          <a:p>
+            <a:r>
+              <a:rPr lang="sv-SE" sz="1600" dirty="0" smtClean="0">
+                <a:solidFill>
+                  <a:schemeClr val="bg1"/>
+                </a:solidFill>
+                <a:latin typeface="Consolas" pitchFamily="49" charset="0"/>
+                <a:cs typeface="Consolas" pitchFamily="49" charset="0"/>
+              </a:rPr>
+              <a:t>}</a:t>
+            </a:r>
+            <a:endParaRPr lang="en-US" sz="1600" dirty="0">
+              <a:solidFill>
+                <a:schemeClr val="bg1"/>
+              </a:solidFill>
+              <a:latin typeface="Consolas" pitchFamily="49" charset="0"/>
+              <a:cs typeface="Consolas" pitchFamily="49" charset="0"/>
+            </a:endParaRPr>
+          </a:p>
+        </p:txBody>
+      </p:sp>
+      <p:sp>
+        <p:nvSpPr>
+          <p:cNvPr id="6" name="TextBox 5"/>
+          <p:cNvSpPr txBox="1"/>
+          <p:nvPr/>
+        </p:nvSpPr>
+        <p:spPr>
+          <a:xfrm>
+            <a:off x="827584" y="1195904"/>
+            <a:ext cx="2190023" cy="523220"/>
+          </a:xfrm>
+          <a:prstGeom prst="rect">
+            <a:avLst/>
+          </a:prstGeom>
+          <a:noFill/>
+        </p:spPr>
+        <p:txBody>
+          <a:bodyPr wrap="none" rtlCol="0">
+            <a:spAutoFit/>
+          </a:bodyPr>
+          <a:lstStyle/>
+          <a:p>
+            <a:r>
+              <a:rPr lang="sv-SE" sz="2800" dirty="0" smtClean="0"/>
+              <a:t>View (Xaml)</a:t>
+            </a:r>
+            <a:endParaRPr lang="en-US" sz="2800" dirty="0"/>
+          </a:p>
+        </p:txBody>
+      </p:sp>
+      <p:sp>
+        <p:nvSpPr>
+          <p:cNvPr id="7" name="TextBox 6"/>
+          <p:cNvSpPr txBox="1"/>
+          <p:nvPr/>
+        </p:nvSpPr>
+        <p:spPr>
+          <a:xfrm>
+            <a:off x="5889256" y="1210708"/>
+            <a:ext cx="2050561" cy="523220"/>
+          </a:xfrm>
+          <a:prstGeom prst="rect">
+            <a:avLst/>
+          </a:prstGeom>
+          <a:noFill/>
+        </p:spPr>
+        <p:txBody>
+          <a:bodyPr wrap="none" rtlCol="0">
+            <a:spAutoFit/>
+          </a:bodyPr>
+          <a:lstStyle/>
+          <a:p>
+            <a:r>
+              <a:rPr lang="sv-SE" sz="2800" dirty="0" smtClean="0"/>
+              <a:t>ViewModel</a:t>
+            </a:r>
+            <a:endParaRPr lang="en-US" sz="2800" dirty="0"/>
+          </a:p>
+        </p:txBody>
+      </p:sp>
+      <p:sp>
+        <p:nvSpPr>
+          <p:cNvPr id="8" name="Right Arrow 7"/>
+          <p:cNvSpPr/>
+          <p:nvPr/>
+        </p:nvSpPr>
+        <p:spPr>
+          <a:xfrm>
+            <a:off x="4243772" y="2852936"/>
+            <a:ext cx="504056" cy="540060"/>
+          </a:xfrm>
+          <a:prstGeom prst="rightArrow">
+            <a:avLst/>
+          </a:prstGeom>
+        </p:spPr>
+        <p:style>
+          <a:lnRef idx="1">
+            <a:schemeClr val="accent1"/>
+          </a:lnRef>
+          <a:fillRef idx="3">
+            <a:schemeClr val="accent1"/>
+          </a:fillRef>
+          <a:effectRef idx="2">
+            <a:schemeClr val="accent1"/>
+          </a:effectRef>
+          <a:fontRef idx="minor">
+            <a:schemeClr val="lt1"/>
+          </a:fontRef>
+        </p:style>
+        <p:txBody>
+          <a:bodyPr rtlCol="0" anchor="ctr"/>
+          <a:lstStyle/>
+          <a:p>
+            <a:pPr algn="ctr"/>
+            <a:endParaRPr lang="en-US"/>
+          </a:p>
+        </p:txBody>
+      </p:sp>
+      <p:sp>
+        <p:nvSpPr>
+          <p:cNvPr id="9" name="Right Arrow 8"/>
+          <p:cNvSpPr/>
+          <p:nvPr/>
+        </p:nvSpPr>
+        <p:spPr>
+          <a:xfrm rot="10800000">
+            <a:off x="3707904" y="2852936"/>
+            <a:ext cx="504056" cy="540060"/>
+          </a:xfrm>
+          <a:prstGeom prst="rightArrow">
+            <a:avLst/>
+          </a:prstGeom>
+        </p:spPr>
+        <p:style>
+          <a:lnRef idx="1">
+            <a:schemeClr val="accent1"/>
+          </a:lnRef>
+          <a:fillRef idx="3">
+            <a:schemeClr val="accent1"/>
+          </a:fillRef>
+          <a:effectRef idx="2">
+            <a:schemeClr val="accent1"/>
+          </a:effectRef>
+          <a:fontRef idx="minor">
+            <a:schemeClr val="lt1"/>
+          </a:fontRef>
+        </p:style>
+        <p:txBody>
+          <a:bodyPr rtlCol="0" anchor="ctr"/>
+          <a:lstStyle/>
+          <a:p>
+            <a:pPr algn="ctr"/>
+            <a:endParaRPr lang="en-US"/>
+          </a:p>
+        </p:txBody>
+      </p:sp>
+    </p:spTree>
+    <p:extLst>
+      <p:ext uri="{BB962C8B-B14F-4D97-AF65-F5344CB8AC3E}">
+        <p14:creationId xmlns:p14="http://schemas.microsoft.com/office/powerpoint/2010/main" val="975136350"/>
+      </p:ext>
+    </p:extLst>
+  </p:cSld>
+  <p:clrMapOvr>
+    <a:masterClrMapping/>
+  </p:clrMapOvr>
+  <p:timing>
+    <p:tnLst>
+      <p:par>
+        <p:cTn id="1" dur="indefinite" restart="never" nodeType="tmRoot"/>
+      </p:par>
+    </p:tnLst>
+  </p:timing>
+</p:sld>
+</file>
+
+<file path=ppt/slides/slide5.xml><?xml version="1.0" encoding="utf-8"?>
+<p:sld xmlns:a="http://schemas.openxmlformats.org/drawingml/2006/main" xmlns:r="http://schemas.openxmlformats.org/officeDocument/2006/relationships" xmlns:p="http://schemas.openxmlformats.org/presentationml/2006/main">
+  <p:cSld>
+    <p:spTree>
+      <p:nvGrpSpPr>
+        <p:cNvPr id="1" name=""/>
+        <p:cNvGrpSpPr/>
+        <p:nvPr/>
+      </p:nvGrpSpPr>
+      <p:grpSpPr>
+        <a:xfrm>
+          <a:off x="0" y="0"/>
+          <a:ext cx="0" cy="0"/>
+          <a:chOff x="0" y="0"/>
+          <a:chExt cx="0" cy="0"/>
+        </a:xfrm>
+      </p:grpSpPr>
       <p:sp>
         <p:nvSpPr>
           <p:cNvPr id="3" name="Content Placeholder 2"/>
@@ -4962,13 +5453,21 @@
             <p:ph idx="1"/>
           </p:nvPr>
         </p:nvSpPr>
-        <p:spPr/>
+        <p:spPr>
+          <a:xfrm>
+            <a:off x="457200" y="188640"/>
+            <a:ext cx="8229600" cy="6120720"/>
+          </a:xfrm>
+        </p:spPr>
         <p:txBody>
           <a:bodyPr>
-            <a:normAutofit/>
+            <a:normAutofit lnSpcReduction="10000"/>
           </a:bodyPr>
           <a:lstStyle/>
           <a:p>
+            <a:pPr marL="137160" indent="0">
+              <a:buNone/>
+            </a:pPr>
             <a:endParaRPr lang="sv-SE" dirty="0" smtClean="0">
               <a:solidFill>
                 <a:srgbClr val="FF0000"/>
@@ -4978,7 +5477,32 @@
           <a:p>
             <a:r>
               <a:rPr lang="sv-SE" sz="3200" dirty="0" smtClean="0"/>
-              <a:t>http://</a:t>
+              <a:t>Blog:  www.codinginstinct.com</a:t>
+            </a:r>
+          </a:p>
+          <a:p>
+            <a:r>
+              <a:rPr lang="sv-SE" sz="3200" dirty="0" smtClean="0"/>
+              <a:t>Email: torkel.odegaard@gmail.com</a:t>
+            </a:r>
+          </a:p>
+          <a:p>
+            <a:r>
+              <a:rPr lang="sv-SE" sz="3200" dirty="0" smtClean="0"/>
+              <a:t>Twitter: @torkelo</a:t>
+            </a:r>
+          </a:p>
+          <a:p>
+            <a:endParaRPr lang="sv-SE" sz="3200" dirty="0"/>
+          </a:p>
+          <a:p>
+            <a:r>
+              <a:rPr lang="sv-SE" sz="3200" dirty="0" smtClean="0"/>
+              <a:t>http</a:t>
+            </a:r>
+            <a:r>
+              <a:rPr lang="sv-SE" sz="3200" dirty="0" smtClean="0"/>
+              <a:t>://</a:t>
             </a:r>
             <a:r>
               <a:rPr lang="sv-SE" sz="3200" dirty="0"/>

</xml_diff>